<commit_message>
slide template for text slide
</commit_message>
<xml_diff>
--- a/inst/extdata/psrc-trends-template.pptx
+++ b/inst/extdata/psrc-trends-template.pptx
@@ -121,7 +121,7 @@
 <file path=ppt/revisionInfo.xml><?xml version="1.0" encoding="utf-8"?>
 <p1510:revInfo xmlns:a="http://schemas.openxmlformats.org/drawingml/2006/main" xmlns:r="http://schemas.openxmlformats.org/officeDocument/2006/relationships" xmlns:p1510="http://schemas.microsoft.com/office/powerpoint/2015/10/main">
   <p1510:revLst>
-    <p1510:client id="{83B57D82-89ED-4022-8B06-0D0AC22F8212}" v="110" dt="2022-08-10T17:03:43.464"/>
+    <p1510:client id="{ECDF7CB1-260E-40E3-94E6-6A9A01661DFB}" v="18" dt="2022-08-12T03:57:09.846"/>
   </p1510:revLst>
 </p1510:revInfo>
 </file>
@@ -184,6 +184,75 @@
           <pc:sldMk cId="2137278857" sldId="256"/>
         </pc:sldMkLst>
       </pc:sldChg>
+    </pc:docChg>
+  </pc:docChgLst>
+  <pc:docChgLst>
+    <pc:chgData name="Craig Helmann" userId="8c17259c-ca5c-4d65-bc5a-2033add90d09" providerId="ADAL" clId="{ECDF7CB1-260E-40E3-94E6-6A9A01661DFB}"/>
+    <pc:docChg chg="modMainMaster">
+      <pc:chgData name="Craig Helmann" userId="8c17259c-ca5c-4d65-bc5a-2033add90d09" providerId="ADAL" clId="{ECDF7CB1-260E-40E3-94E6-6A9A01661DFB}" dt="2022-08-12T03:57:09.846" v="33" actId="207"/>
+      <pc:docMkLst>
+        <pc:docMk/>
+      </pc:docMkLst>
+      <pc:sldMasterChg chg="addSldLayout modSldLayout sldLayoutOrd">
+        <pc:chgData name="Craig Helmann" userId="8c17259c-ca5c-4d65-bc5a-2033add90d09" providerId="ADAL" clId="{ECDF7CB1-260E-40E3-94E6-6A9A01661DFB}" dt="2022-08-12T03:57:09.846" v="33" actId="207"/>
+        <pc:sldMasterMkLst>
+          <pc:docMk/>
+          <pc:sldMasterMk cId="1287913243" sldId="2147483648"/>
+        </pc:sldMasterMkLst>
+        <pc:sldLayoutChg chg="addSp delSp modSp new mod ord">
+          <pc:chgData name="Craig Helmann" userId="8c17259c-ca5c-4d65-bc5a-2033add90d09" providerId="ADAL" clId="{ECDF7CB1-260E-40E3-94E6-6A9A01661DFB}" dt="2022-08-12T03:57:09.846" v="33" actId="207"/>
+          <pc:sldLayoutMkLst>
+            <pc:docMk/>
+            <pc:sldMasterMk cId="1287913243" sldId="2147483648"/>
+            <pc:sldLayoutMk cId="2956063517" sldId="2147483660"/>
+          </pc:sldLayoutMkLst>
+          <pc:spChg chg="mod">
+            <ac:chgData name="Craig Helmann" userId="8c17259c-ca5c-4d65-bc5a-2033add90d09" providerId="ADAL" clId="{ECDF7CB1-260E-40E3-94E6-6A9A01661DFB}" dt="2022-08-12T03:53:32.159" v="10" actId="14100"/>
+            <ac:spMkLst>
+              <pc:docMk/>
+              <pc:sldMasterMk cId="1287913243" sldId="2147483648"/>
+              <pc:sldLayoutMk cId="2956063517" sldId="2147483660"/>
+              <ac:spMk id="2" creationId="{520B8A35-FC85-A651-1F16-9F3D51824D09}"/>
+            </ac:spMkLst>
+          </pc:spChg>
+          <pc:spChg chg="add del">
+            <ac:chgData name="Craig Helmann" userId="8c17259c-ca5c-4d65-bc5a-2033add90d09" providerId="ADAL" clId="{ECDF7CB1-260E-40E3-94E6-6A9A01661DFB}" dt="2022-08-12T03:54:05.151" v="11" actId="11529"/>
+            <ac:spMkLst>
+              <pc:docMk/>
+              <pc:sldMasterMk cId="1287913243" sldId="2147483648"/>
+              <pc:sldLayoutMk cId="2956063517" sldId="2147483660"/>
+              <ac:spMk id="3" creationId="{DA7295C1-D7EC-39FC-89CC-E3A22930A08B}"/>
+            </ac:spMkLst>
+          </pc:spChg>
+          <pc:spChg chg="add mod">
+            <ac:chgData name="Craig Helmann" userId="8c17259c-ca5c-4d65-bc5a-2033add90d09" providerId="ADAL" clId="{ECDF7CB1-260E-40E3-94E6-6A9A01661DFB}" dt="2022-08-12T03:55:01.167" v="21" actId="1076"/>
+            <ac:spMkLst>
+              <pc:docMk/>
+              <pc:sldMasterMk cId="1287913243" sldId="2147483648"/>
+              <pc:sldLayoutMk cId="2956063517" sldId="2147483660"/>
+              <ac:spMk id="4" creationId="{A853693C-2913-C428-EB33-7A949188E617}"/>
+            </ac:spMkLst>
+          </pc:spChg>
+          <pc:spChg chg="add del">
+            <ac:chgData name="Craig Helmann" userId="8c17259c-ca5c-4d65-bc5a-2033add90d09" providerId="ADAL" clId="{ECDF7CB1-260E-40E3-94E6-6A9A01661DFB}" dt="2022-08-12T03:55:38.541" v="22" actId="11529"/>
+            <ac:spMkLst>
+              <pc:docMk/>
+              <pc:sldMasterMk cId="1287913243" sldId="2147483648"/>
+              <pc:sldLayoutMk cId="2956063517" sldId="2147483660"/>
+              <ac:spMk id="5" creationId="{80D09C0A-2448-C51A-48DC-0F4718CB414D}"/>
+            </ac:spMkLst>
+          </pc:spChg>
+          <pc:spChg chg="add mod">
+            <ac:chgData name="Craig Helmann" userId="8c17259c-ca5c-4d65-bc5a-2033add90d09" providerId="ADAL" clId="{ECDF7CB1-260E-40E3-94E6-6A9A01661DFB}" dt="2022-08-12T03:57:09.846" v="33" actId="207"/>
+            <ac:spMkLst>
+              <pc:docMk/>
+              <pc:sldMasterMk cId="1287913243" sldId="2147483648"/>
+              <pc:sldLayoutMk cId="2956063517" sldId="2147483660"/>
+              <ac:spMk id="6" creationId="{1AA8E364-9075-A489-2161-C540F3432293}"/>
+            </ac:spMkLst>
+          </pc:spChg>
+        </pc:sldLayoutChg>
+      </pc:sldMasterChg>
     </pc:docChg>
   </pc:docChgLst>
   <pc:docChgLst>
@@ -1068,7 +1137,7 @@
           <a:p>
             <a:fld id="{212E90E9-66C7-4260-A9F0-E87602C3DBDD}" type="datetimeFigureOut">
               <a:rPr lang="en-US" smtClean="0"/>
-              <a:t>8/10/2022</a:t>
+              <a:t>8/11/2022</a:t>
             </a:fld>
             <a:endParaRPr lang="en-US"/>
           </a:p>
@@ -1245,7 +1314,7 @@
           <a:p>
             <a:fld id="{11AC3EB4-E1C8-4271-8198-F0601D845669}" type="datetimeFigureOut">
               <a:rPr lang="en-US" smtClean="0"/>
-              <a:t>8/10/2022</a:t>
+              <a:t>8/11/2022</a:t>
             </a:fld>
             <a:endParaRPr lang="en-US"/>
           </a:p>
@@ -1722,7 +1791,7 @@
           <a:p>
             <a:fld id="{E739D145-51D9-4F2E-AFAC-E46ADDDF22F8}" type="datetime3">
               <a:rPr lang="en-US" smtClean="0"/>
-              <a:t>10 August 2022</a:t>
+              <a:t>11 August 2022</a:t>
             </a:fld>
             <a:endParaRPr lang="en-US" dirty="0"/>
           </a:p>
@@ -1884,6 +1953,228 @@
 
 <file path=ppt/slideLayouts/slideLayout3.xml><?xml version="1.0" encoding="utf-8"?>
 <p:sldLayout xmlns:a="http://schemas.openxmlformats.org/drawingml/2006/main" xmlns:r="http://schemas.openxmlformats.org/officeDocument/2006/relationships" xmlns:p="http://schemas.openxmlformats.org/presentationml/2006/main" preserve="1" userDrawn="1">
+  <p:cSld name="Title with Full Text and Caption">
+    <p:spTree>
+      <p:nvGrpSpPr>
+        <p:cNvPr id="1" name=""/>
+        <p:cNvGrpSpPr/>
+        <p:nvPr/>
+      </p:nvGrpSpPr>
+      <p:grpSpPr>
+        <a:xfrm>
+          <a:off x="0" y="0"/>
+          <a:ext cx="0" cy="0"/>
+          <a:chOff x="0" y="0"/>
+          <a:chExt cx="0" cy="0"/>
+        </a:xfrm>
+      </p:grpSpPr>
+      <p:sp>
+        <p:nvSpPr>
+          <p:cNvPr id="2" name="Title 1">
+            <a:extLst>
+              <a:ext uri="{FF2B5EF4-FFF2-40B4-BE49-F238E27FC236}">
+                <a16:creationId xmlns:a16="http://schemas.microsoft.com/office/drawing/2014/main" id="{520B8A35-FC85-A651-1F16-9F3D51824D09}"/>
+              </a:ext>
+            </a:extLst>
+          </p:cNvPr>
+          <p:cNvSpPr>
+            <a:spLocks noGrp="1"/>
+          </p:cNvSpPr>
+          <p:nvPr>
+            <p:ph type="title"/>
+          </p:nvPr>
+        </p:nvSpPr>
+        <p:spPr>
+          <a:xfrm>
+            <a:off x="838200" y="137160"/>
+            <a:ext cx="10323576" cy="649224"/>
+          </a:xfrm>
+        </p:spPr>
+        <p:txBody>
+          <a:bodyPr>
+            <a:normAutofit/>
+          </a:bodyPr>
+          <a:lstStyle>
+            <a:lvl1pPr>
+              <a:defRPr sz="2400">
+                <a:solidFill>
+                  <a:schemeClr val="bg1"/>
+                </a:solidFill>
+                <a:latin typeface="Poppins Black" panose="00000A00000000000000" pitchFamily="2" charset="0"/>
+                <a:cs typeface="Poppins Black" panose="00000A00000000000000" pitchFamily="2" charset="0"/>
+              </a:defRPr>
+            </a:lvl1pPr>
+          </a:lstStyle>
+          <a:p>
+            <a:r>
+              <a:rPr lang="en-US"/>
+              <a:t>Click to edit Master title style</a:t>
+            </a:r>
+          </a:p>
+        </p:txBody>
+      </p:sp>
+      <p:sp>
+        <p:nvSpPr>
+          <p:cNvPr id="4" name="Text Placeholder 3">
+            <a:extLst>
+              <a:ext uri="{FF2B5EF4-FFF2-40B4-BE49-F238E27FC236}">
+                <a16:creationId xmlns:a16="http://schemas.microsoft.com/office/drawing/2014/main" id="{A853693C-2913-C428-EB33-7A949188E617}"/>
+              </a:ext>
+            </a:extLst>
+          </p:cNvPr>
+          <p:cNvSpPr>
+            <a:spLocks noGrp="1"/>
+          </p:cNvSpPr>
+          <p:nvPr>
+            <p:ph type="body" sz="quarter" idx="10"/>
+          </p:nvPr>
+        </p:nvSpPr>
+        <p:spPr>
+          <a:xfrm>
+            <a:off x="841248" y="1088136"/>
+            <a:ext cx="10515600" cy="1060704"/>
+          </a:xfrm>
+        </p:spPr>
+        <p:txBody>
+          <a:bodyPr>
+            <a:normAutofit/>
+          </a:bodyPr>
+          <a:lstStyle>
+            <a:lvl1pPr marL="0" indent="0">
+              <a:buNone/>
+              <a:defRPr sz="2000">
+                <a:solidFill>
+                  <a:srgbClr val="4A0048"/>
+                </a:solidFill>
+              </a:defRPr>
+            </a:lvl1pPr>
+            <a:lvl2pPr marL="457200" indent="0">
+              <a:buNone/>
+              <a:defRPr/>
+            </a:lvl2pPr>
+          </a:lstStyle>
+          <a:p>
+            <a:pPr lvl="0"/>
+            <a:r>
+              <a:rPr lang="en-US" dirty="0"/>
+              <a:t>Click to edit Master text styles</a:t>
+            </a:r>
+          </a:p>
+        </p:txBody>
+      </p:sp>
+      <p:sp>
+        <p:nvSpPr>
+          <p:cNvPr id="6" name="Text Placeholder 5">
+            <a:extLst>
+              <a:ext uri="{FF2B5EF4-FFF2-40B4-BE49-F238E27FC236}">
+                <a16:creationId xmlns:a16="http://schemas.microsoft.com/office/drawing/2014/main" id="{1AA8E364-9075-A489-2161-C540F3432293}"/>
+              </a:ext>
+            </a:extLst>
+          </p:cNvPr>
+          <p:cNvSpPr>
+            <a:spLocks noGrp="1"/>
+          </p:cNvSpPr>
+          <p:nvPr>
+            <p:ph type="body" sz="quarter" idx="11"/>
+          </p:nvPr>
+        </p:nvSpPr>
+        <p:spPr>
+          <a:xfrm>
+            <a:off x="838200" y="2221992"/>
+            <a:ext cx="10515600" cy="3904488"/>
+          </a:xfrm>
+        </p:spPr>
+        <p:txBody>
+          <a:bodyPr/>
+          <a:lstStyle>
+            <a:lvl1pPr>
+              <a:defRPr sz="1800">
+                <a:solidFill>
+                  <a:srgbClr val="005753"/>
+                </a:solidFill>
+              </a:defRPr>
+            </a:lvl1pPr>
+            <a:lvl2pPr>
+              <a:defRPr sz="1600">
+                <a:solidFill>
+                  <a:srgbClr val="005753"/>
+                </a:solidFill>
+              </a:defRPr>
+            </a:lvl2pPr>
+            <a:lvl3pPr>
+              <a:defRPr sz="1400">
+                <a:solidFill>
+                  <a:srgbClr val="005753"/>
+                </a:solidFill>
+              </a:defRPr>
+            </a:lvl3pPr>
+            <a:lvl4pPr>
+              <a:defRPr sz="1200">
+                <a:solidFill>
+                  <a:srgbClr val="005753"/>
+                </a:solidFill>
+              </a:defRPr>
+            </a:lvl4pPr>
+            <a:lvl5pPr>
+              <a:defRPr sz="1000">
+                <a:solidFill>
+                  <a:srgbClr val="005753"/>
+                </a:solidFill>
+              </a:defRPr>
+            </a:lvl5pPr>
+          </a:lstStyle>
+          <a:p>
+            <a:pPr lvl="0"/>
+            <a:r>
+              <a:rPr lang="en-US" dirty="0"/>
+              <a:t>Click to edit Master text styles</a:t>
+            </a:r>
+          </a:p>
+          <a:p>
+            <a:pPr lvl="1"/>
+            <a:r>
+              <a:rPr lang="en-US" dirty="0"/>
+              <a:t>Second level</a:t>
+            </a:r>
+          </a:p>
+          <a:p>
+            <a:pPr lvl="2"/>
+            <a:r>
+              <a:rPr lang="en-US" dirty="0"/>
+              <a:t>Third level</a:t>
+            </a:r>
+          </a:p>
+          <a:p>
+            <a:pPr lvl="3"/>
+            <a:r>
+              <a:rPr lang="en-US" dirty="0"/>
+              <a:t>Fourth level</a:t>
+            </a:r>
+          </a:p>
+          <a:p>
+            <a:pPr lvl="4"/>
+            <a:r>
+              <a:rPr lang="en-US" dirty="0"/>
+              <a:t>Fifth level</a:t>
+            </a:r>
+          </a:p>
+        </p:txBody>
+      </p:sp>
+    </p:spTree>
+    <p:extLst>
+      <p:ext uri="{BB962C8B-B14F-4D97-AF65-F5344CB8AC3E}">
+        <p14:creationId xmlns:p14="http://schemas.microsoft.com/office/powerpoint/2010/main" val="2956063517"/>
+      </p:ext>
+    </p:extLst>
+  </p:cSld>
+  <p:clrMapOvr>
+    <a:masterClrMapping/>
+  </p:clrMapOvr>
+</p:sldLayout>
+</file>
+
+<file path=ppt/slideLayouts/slideLayout4.xml><?xml version="1.0" encoding="utf-8"?>
+<p:sldLayout xmlns:a="http://schemas.openxmlformats.org/drawingml/2006/main" xmlns:r="http://schemas.openxmlformats.org/officeDocument/2006/relationships" xmlns:p="http://schemas.openxmlformats.org/presentationml/2006/main" preserve="1" userDrawn="1">
   <p:cSld name="Title with Full Chart and Caption">
     <p:spTree>
       <p:nvGrpSpPr>
@@ -2077,7 +2368,7 @@
 </p:sldLayout>
 </file>
 
-<file path=ppt/slideLayouts/slideLayout4.xml><?xml version="1.0" encoding="utf-8"?>
+<file path=ppt/slideLayouts/slideLayout5.xml><?xml version="1.0" encoding="utf-8"?>
 <p:sldLayout xmlns:a="http://schemas.openxmlformats.org/drawingml/2006/main" xmlns:r="http://schemas.openxmlformats.org/officeDocument/2006/relationships" xmlns:p="http://schemas.openxmlformats.org/presentationml/2006/main" preserve="1" userDrawn="1">
   <p:cSld name="Two Charts with Caption">
     <p:spTree>
@@ -2257,7 +2548,7 @@
 </p:sldLayout>
 </file>
 
-<file path=ppt/slideLayouts/slideLayout5.xml><?xml version="1.0" encoding="utf-8"?>
+<file path=ppt/slideLayouts/slideLayout6.xml><?xml version="1.0" encoding="utf-8"?>
 <p:sldLayout xmlns:a="http://schemas.openxmlformats.org/drawingml/2006/main" xmlns:r="http://schemas.openxmlformats.org/officeDocument/2006/relationships" xmlns:p="http://schemas.openxmlformats.org/presentationml/2006/main" preserve="1" userDrawn="1">
   <p:cSld name="Transition Slide">
     <p:spTree>
@@ -2362,7 +2653,7 @@
 </p:sldLayout>
 </file>
 
-<file path=ppt/slideLayouts/slideLayout6.xml><?xml version="1.0" encoding="utf-8"?>
+<file path=ppt/slideLayouts/slideLayout7.xml><?xml version="1.0" encoding="utf-8"?>
 <p:sldLayout xmlns:a="http://schemas.openxmlformats.org/drawingml/2006/main" xmlns:r="http://schemas.openxmlformats.org/officeDocument/2006/relationships" xmlns:p="http://schemas.openxmlformats.org/presentationml/2006/main" preserve="1" userDrawn="1">
   <p:cSld name="Title with Bullets, Chart and Caption">
     <p:spTree>
@@ -3055,7 +3346,7 @@
           <p:nvPr userDrawn="1"/>
         </p:nvPicPr>
         <p:blipFill>
-          <a:blip r:embed="rId8">
+          <a:blip r:embed="rId9">
             <a:extLst>
               <a:ext uri="{28A0092B-C50C-407E-A947-70E740481C1C}">
                 <a14:useLocalDpi xmlns:a14="http://schemas.microsoft.com/office/drawing/2010/main" val="0"/>
@@ -3091,7 +3382,7 @@
           <p:nvPr userDrawn="1"/>
         </p:nvPicPr>
         <p:blipFill>
-          <a:blip r:embed="rId9">
+          <a:blip r:embed="rId10">
             <a:extLst>
               <a:ext uri="{28A0092B-C50C-407E-A947-70E740481C1C}">
                 <a14:useLocalDpi xmlns:a14="http://schemas.microsoft.com/office/drawing/2010/main" val="0"/>
@@ -3159,7 +3450,7 @@
                 <a:latin typeface="Poppins" panose="00000500000000000000" pitchFamily="2" charset="0"/>
                 <a:cs typeface="Poppins" panose="00000500000000000000" pitchFamily="2" charset="0"/>
               </a:rPr>
-              <a:t>10 August 2022</a:t>
+              <a:t>11 August 2022</a:t>
             </a:fld>
             <a:endParaRPr lang="en-US" sz="1100" dirty="0">
               <a:solidFill>
@@ -3182,10 +3473,11 @@
   <p:sldLayoutIdLst>
     <p:sldLayoutId id="2147483649" r:id="rId1"/>
     <p:sldLayoutId id="2147483655" r:id="rId2"/>
-    <p:sldLayoutId id="2147483656" r:id="rId3"/>
-    <p:sldLayoutId id="2147483659" r:id="rId4"/>
-    <p:sldLayoutId id="2147483657" r:id="rId5"/>
-    <p:sldLayoutId id="2147483658" r:id="rId6"/>
+    <p:sldLayoutId id="2147483660" r:id="rId3"/>
+    <p:sldLayoutId id="2147483656" r:id="rId4"/>
+    <p:sldLayoutId id="2147483659" r:id="rId5"/>
+    <p:sldLayoutId id="2147483657" r:id="rId6"/>
+    <p:sldLayoutId id="2147483658" r:id="rId7"/>
   </p:sldLayoutIdLst>
   <p:hf sldNum="0" hdr="0" ftr="0"/>
   <p:txStyles>

</xml_diff>

<commit_message>
full text slide added
</commit_message>
<xml_diff>
--- a/inst/extdata/psrc-trends-template.pptx
+++ b/inst/extdata/psrc-trends-template.pptx
@@ -121,7 +121,7 @@
 <file path=ppt/revisionInfo.xml><?xml version="1.0" encoding="utf-8"?>
 <p1510:revInfo xmlns:a="http://schemas.openxmlformats.org/drawingml/2006/main" xmlns:r="http://schemas.openxmlformats.org/officeDocument/2006/relationships" xmlns:p1510="http://schemas.microsoft.com/office/powerpoint/2015/10/main">
   <p1510:revLst>
-    <p1510:client id="{ECDF7CB1-260E-40E3-94E6-6A9A01661DFB}" v="18" dt="2022-08-12T03:57:09.846"/>
+    <p1510:client id="{ECDF7CB1-260E-40E3-94E6-6A9A01661DFB}" v="24" dt="2022-08-12T16:16:29.601"/>
   </p1510:revLst>
 </p1510:revInfo>
 </file>
@@ -188,17 +188,86 @@
   </pc:docChgLst>
   <pc:docChgLst>
     <pc:chgData name="Craig Helmann" userId="8c17259c-ca5c-4d65-bc5a-2033add90d09" providerId="ADAL" clId="{ECDF7CB1-260E-40E3-94E6-6A9A01661DFB}"/>
-    <pc:docChg chg="modMainMaster">
-      <pc:chgData name="Craig Helmann" userId="8c17259c-ca5c-4d65-bc5a-2033add90d09" providerId="ADAL" clId="{ECDF7CB1-260E-40E3-94E6-6A9A01661DFB}" dt="2022-08-12T03:57:09.846" v="33" actId="207"/>
+    <pc:docChg chg="custSel modMainMaster">
+      <pc:chgData name="Craig Helmann" userId="8c17259c-ca5c-4d65-bc5a-2033add90d09" providerId="ADAL" clId="{ECDF7CB1-260E-40E3-94E6-6A9A01661DFB}" dt="2022-08-12T16:56:53.561" v="162" actId="1076"/>
       <pc:docMkLst>
         <pc:docMk/>
       </pc:docMkLst>
-      <pc:sldMasterChg chg="addSldLayout modSldLayout sldLayoutOrd">
-        <pc:chgData name="Craig Helmann" userId="8c17259c-ca5c-4d65-bc5a-2033add90d09" providerId="ADAL" clId="{ECDF7CB1-260E-40E3-94E6-6A9A01661DFB}" dt="2022-08-12T03:57:09.846" v="33" actId="207"/>
+      <pc:sldMasterChg chg="modSp mod addSldLayout modSldLayout sldLayoutOrd">
+        <pc:chgData name="Craig Helmann" userId="8c17259c-ca5c-4d65-bc5a-2033add90d09" providerId="ADAL" clId="{ECDF7CB1-260E-40E3-94E6-6A9A01661DFB}" dt="2022-08-12T16:56:53.561" v="162" actId="1076"/>
         <pc:sldMasterMkLst>
           <pc:docMk/>
           <pc:sldMasterMk cId="1287913243" sldId="2147483648"/>
         </pc:sldMasterMkLst>
+        <pc:spChg chg="mod">
+          <ac:chgData name="Craig Helmann" userId="8c17259c-ca5c-4d65-bc5a-2033add90d09" providerId="ADAL" clId="{ECDF7CB1-260E-40E3-94E6-6A9A01661DFB}" dt="2022-08-12T16:18:36.485" v="45" actId="255"/>
+          <ac:spMkLst>
+            <pc:docMk/>
+            <pc:sldMasterMk cId="1287913243" sldId="2147483648"/>
+            <ac:spMk id="2" creationId="{9982A3C5-2536-4D5A-AA52-EC5AA5CDDA7F}"/>
+          </ac:spMkLst>
+        </pc:spChg>
+        <pc:spChg chg="mod">
+          <ac:chgData name="Craig Helmann" userId="8c17259c-ca5c-4d65-bc5a-2033add90d09" providerId="ADAL" clId="{ECDF7CB1-260E-40E3-94E6-6A9A01661DFB}" dt="2022-08-12T16:16:29.601" v="39" actId="207"/>
+          <ac:spMkLst>
+            <pc:docMk/>
+            <pc:sldMasterMk cId="1287913243" sldId="2147483648"/>
+            <ac:spMk id="3" creationId="{72FED228-B52C-461B-923B-F3A6BB3E86A2}"/>
+          </ac:spMkLst>
+        </pc:spChg>
+        <pc:sldLayoutChg chg="delSp modSp mod">
+          <pc:chgData name="Craig Helmann" userId="8c17259c-ca5c-4d65-bc5a-2033add90d09" providerId="ADAL" clId="{ECDF7CB1-260E-40E3-94E6-6A9A01661DFB}" dt="2022-08-12T16:56:53.561" v="162" actId="1076"/>
+          <pc:sldLayoutMkLst>
+            <pc:docMk/>
+            <pc:sldMasterMk cId="1287913243" sldId="2147483648"/>
+            <pc:sldLayoutMk cId="1152289754" sldId="2147483658"/>
+          </pc:sldLayoutMkLst>
+          <pc:spChg chg="mod">
+            <ac:chgData name="Craig Helmann" userId="8c17259c-ca5c-4d65-bc5a-2033add90d09" providerId="ADAL" clId="{ECDF7CB1-260E-40E3-94E6-6A9A01661DFB}" dt="2022-08-12T16:55:35.008" v="155" actId="14100"/>
+            <ac:spMkLst>
+              <pc:docMk/>
+              <pc:sldMasterMk cId="1287913243" sldId="2147483648"/>
+              <pc:sldLayoutMk cId="1152289754" sldId="2147483658"/>
+              <ac:spMk id="4" creationId="{BEDFE6AC-6560-C0C8-AC74-9CDA106D2B7D}"/>
+            </ac:spMkLst>
+          </pc:spChg>
+          <pc:spChg chg="mod">
+            <ac:chgData name="Craig Helmann" userId="8c17259c-ca5c-4d65-bc5a-2033add90d09" providerId="ADAL" clId="{ECDF7CB1-260E-40E3-94E6-6A9A01661DFB}" dt="2022-08-12T16:56:31.472" v="160" actId="14100"/>
+            <ac:spMkLst>
+              <pc:docMk/>
+              <pc:sldMasterMk cId="1287913243" sldId="2147483648"/>
+              <pc:sldLayoutMk cId="1152289754" sldId="2147483658"/>
+              <ac:spMk id="5" creationId="{F787A9B8-72B0-233B-BE65-118AC70847E9}"/>
+            </ac:spMkLst>
+          </pc:spChg>
+          <pc:spChg chg="mod">
+            <ac:chgData name="Craig Helmann" userId="8c17259c-ca5c-4d65-bc5a-2033add90d09" providerId="ADAL" clId="{ECDF7CB1-260E-40E3-94E6-6A9A01661DFB}" dt="2022-08-12T16:56:53.561" v="162" actId="1076"/>
+            <ac:spMkLst>
+              <pc:docMk/>
+              <pc:sldMasterMk cId="1287913243" sldId="2147483648"/>
+              <pc:sldLayoutMk cId="1152289754" sldId="2147483658"/>
+              <ac:spMk id="6" creationId="{76B2037E-209D-AB19-C3D8-25AB59CCF577}"/>
+            </ac:spMkLst>
+          </pc:spChg>
+          <pc:spChg chg="del">
+            <ac:chgData name="Craig Helmann" userId="8c17259c-ca5c-4d65-bc5a-2033add90d09" providerId="ADAL" clId="{ECDF7CB1-260E-40E3-94E6-6A9A01661DFB}" dt="2022-08-12T16:43:29.798" v="46" actId="478"/>
+            <ac:spMkLst>
+              <pc:docMk/>
+              <pc:sldMasterMk cId="1287913243" sldId="2147483648"/>
+              <pc:sldLayoutMk cId="1152289754" sldId="2147483658"/>
+              <ac:spMk id="9" creationId="{54E0F4CE-0668-E309-1185-40C29E4CD29D}"/>
+            </ac:spMkLst>
+          </pc:spChg>
+          <pc:spChg chg="del">
+            <ac:chgData name="Craig Helmann" userId="8c17259c-ca5c-4d65-bc5a-2033add90d09" providerId="ADAL" clId="{ECDF7CB1-260E-40E3-94E6-6A9A01661DFB}" dt="2022-08-12T16:43:31.232" v="47" actId="478"/>
+            <ac:spMkLst>
+              <pc:docMk/>
+              <pc:sldMasterMk cId="1287913243" sldId="2147483648"/>
+              <pc:sldLayoutMk cId="1152289754" sldId="2147483658"/>
+              <ac:spMk id="11" creationId="{89DACE51-A082-AB8A-B9EB-E87B4F356D0F}"/>
+            </ac:spMkLst>
+          </pc:spChg>
+        </pc:sldLayoutChg>
         <pc:sldLayoutChg chg="addSp delSp modSp new mod ord">
           <pc:chgData name="Craig Helmann" userId="8c17259c-ca5c-4d65-bc5a-2033add90d09" providerId="ADAL" clId="{ECDF7CB1-260E-40E3-94E6-6A9A01661DFB}" dt="2022-08-12T03:57:09.846" v="33" actId="207"/>
           <pc:sldLayoutMkLst>
@@ -1137,7 +1206,7 @@
           <a:p>
             <a:fld id="{212E90E9-66C7-4260-A9F0-E87602C3DBDD}" type="datetimeFigureOut">
               <a:rPr lang="en-US" smtClean="0"/>
-              <a:t>8/11/2022</a:t>
+              <a:t>8/12/2022</a:t>
             </a:fld>
             <a:endParaRPr lang="en-US"/>
           </a:p>
@@ -1314,7 +1383,7 @@
           <a:p>
             <a:fld id="{11AC3EB4-E1C8-4271-8198-F0601D845669}" type="datetimeFigureOut">
               <a:rPr lang="en-US" smtClean="0"/>
-              <a:t>8/11/2022</a:t>
+              <a:t>8/12/2022</a:t>
             </a:fld>
             <a:endParaRPr lang="en-US"/>
           </a:p>
@@ -1791,7 +1860,7 @@
           <a:p>
             <a:fld id="{E739D145-51D9-4F2E-AFAC-E46ADDDF22F8}" type="datetime3">
               <a:rPr lang="en-US" smtClean="0"/>
-              <a:t>11 August 2022</a:t>
+              <a:t>12 August 2022</a:t>
             </a:fld>
             <a:endParaRPr lang="en-US" dirty="0"/>
           </a:p>
@@ -2733,8 +2802,8 @@
         </p:nvSpPr>
         <p:spPr>
           <a:xfrm>
-            <a:off x="5224272" y="2225040"/>
-            <a:ext cx="6129528" cy="3769362"/>
+            <a:off x="6196766" y="1086937"/>
+            <a:ext cx="5120640" cy="5120640"/>
           </a:xfrm>
         </p:spPr>
         <p:txBody>
@@ -2764,7 +2833,7 @@
         <p:spPr>
           <a:xfrm>
             <a:off x="838200" y="1085850"/>
-            <a:ext cx="10515600" cy="1060450"/>
+            <a:ext cx="5257800" cy="914400"/>
           </a:xfrm>
         </p:spPr>
         <p:txBody>
@@ -2848,22 +2917,22 @@
         </p:nvSpPr>
         <p:spPr>
           <a:xfrm>
-            <a:off x="838199" y="2225674"/>
-            <a:ext cx="4343400" cy="1216152"/>
+            <a:off x="838199" y="2057400"/>
+            <a:ext cx="5257800" cy="4114800"/>
           </a:xfrm>
         </p:spPr>
         <p:txBody>
           <a:bodyPr/>
           <a:lstStyle>
             <a:lvl1pPr>
-              <a:defRPr sz="1600">
+              <a:defRPr sz="1800">
                 <a:solidFill>
                   <a:srgbClr val="005753"/>
                 </a:solidFill>
               </a:defRPr>
             </a:lvl1pPr>
             <a:lvl2pPr>
-              <a:defRPr sz="1400">
+              <a:defRPr sz="1600">
                 <a:solidFill>
                   <a:srgbClr val="005753"/>
                 </a:solidFill>
@@ -2890,139 +2959,6 @@
                 </a:solidFill>
               </a:defRPr>
             </a:lvl5pPr>
-          </a:lstStyle>
-          <a:p>
-            <a:pPr lvl="0"/>
-            <a:r>
-              <a:rPr lang="en-US" dirty="0"/>
-              <a:t>Click to edit Master text styles</a:t>
-            </a:r>
-          </a:p>
-          <a:p>
-            <a:pPr lvl="1"/>
-            <a:r>
-              <a:rPr lang="en-US" dirty="0"/>
-              <a:t>Second level</a:t>
-            </a:r>
-          </a:p>
-        </p:txBody>
-      </p:sp>
-      <p:sp>
-        <p:nvSpPr>
-          <p:cNvPr id="9" name="Text Placeholder 8">
-            <a:extLst>
-              <a:ext uri="{FF2B5EF4-FFF2-40B4-BE49-F238E27FC236}">
-                <a16:creationId xmlns:a16="http://schemas.microsoft.com/office/drawing/2014/main" id="{54E0F4CE-0668-E309-1185-40C29E4CD29D}"/>
-              </a:ext>
-            </a:extLst>
-          </p:cNvPr>
-          <p:cNvSpPr>
-            <a:spLocks noGrp="1"/>
-          </p:cNvSpPr>
-          <p:nvPr>
-            <p:ph type="body" sz="quarter" idx="13"/>
-          </p:nvPr>
-        </p:nvSpPr>
-        <p:spPr>
-          <a:xfrm>
-            <a:off x="838198" y="3505935"/>
-            <a:ext cx="4343400" cy="1216152"/>
-          </a:xfrm>
-        </p:spPr>
-        <p:txBody>
-          <a:bodyPr/>
-          <a:lstStyle>
-            <a:lvl1pPr>
-              <a:defRPr sz="1600">
-                <a:solidFill>
-                  <a:srgbClr val="005753"/>
-                </a:solidFill>
-              </a:defRPr>
-            </a:lvl1pPr>
-            <a:lvl2pPr>
-              <a:defRPr sz="1400">
-                <a:solidFill>
-                  <a:srgbClr val="005753"/>
-                </a:solidFill>
-              </a:defRPr>
-            </a:lvl2pPr>
-            <a:lvl3pPr>
-              <a:defRPr>
-                <a:solidFill>
-                  <a:srgbClr val="EC9B21"/>
-                </a:solidFill>
-              </a:defRPr>
-            </a:lvl3pPr>
-            <a:lvl4pPr>
-              <a:defRPr>
-                <a:solidFill>
-                  <a:srgbClr val="EC9B21"/>
-                </a:solidFill>
-              </a:defRPr>
-            </a:lvl4pPr>
-            <a:lvl5pPr>
-              <a:defRPr>
-                <a:solidFill>
-                  <a:srgbClr val="EC9B21"/>
-                </a:solidFill>
-              </a:defRPr>
-            </a:lvl5pPr>
-          </a:lstStyle>
-          <a:p>
-            <a:pPr lvl="0"/>
-            <a:r>
-              <a:rPr lang="en-US" dirty="0"/>
-              <a:t>Click to edit Master text styles</a:t>
-            </a:r>
-          </a:p>
-          <a:p>
-            <a:pPr lvl="1"/>
-            <a:r>
-              <a:rPr lang="en-US" dirty="0"/>
-              <a:t>Second level</a:t>
-            </a:r>
-          </a:p>
-        </p:txBody>
-      </p:sp>
-      <p:sp>
-        <p:nvSpPr>
-          <p:cNvPr id="11" name="Text Placeholder 10">
-            <a:extLst>
-              <a:ext uri="{FF2B5EF4-FFF2-40B4-BE49-F238E27FC236}">
-                <a16:creationId xmlns:a16="http://schemas.microsoft.com/office/drawing/2014/main" id="{89DACE51-A082-AB8A-B9EB-E87B4F356D0F}"/>
-              </a:ext>
-            </a:extLst>
-          </p:cNvPr>
-          <p:cNvSpPr>
-            <a:spLocks noGrp="1"/>
-          </p:cNvSpPr>
-          <p:nvPr>
-            <p:ph type="body" sz="quarter" idx="14"/>
-          </p:nvPr>
-        </p:nvSpPr>
-        <p:spPr>
-          <a:xfrm>
-            <a:off x="838197" y="4786197"/>
-            <a:ext cx="4343400" cy="1216152"/>
-          </a:xfrm>
-        </p:spPr>
-        <p:txBody>
-          <a:bodyPr/>
-          <a:lstStyle>
-            <a:lvl1pPr>
-              <a:defRPr sz="1600">
-                <a:solidFill>
-                  <a:srgbClr val="005753"/>
-                </a:solidFill>
-              </a:defRPr>
-            </a:lvl1pPr>
-            <a:lvl2pPr>
-              <a:defRPr sz="1400">
-                <a:solidFill>
-                  <a:srgbClr val="005753"/>
-                </a:solidFill>
-              </a:defRPr>
-            </a:lvl2pPr>
           </a:lstStyle>
           <a:p>
             <a:pPr lvl="0"/>
@@ -3194,8 +3130,8 @@
         </p:nvSpPr>
         <p:spPr>
           <a:xfrm>
-            <a:off x="838200" y="365125"/>
-            <a:ext cx="10515600" cy="1325563"/>
+            <a:off x="838200" y="137160"/>
+            <a:ext cx="10323576" cy="649224"/>
           </a:xfrm>
           <a:prstGeom prst="rect">
             <a:avLst/>
@@ -3450,7 +3386,7 @@
                 <a:latin typeface="Poppins" panose="00000500000000000000" pitchFamily="2" charset="0"/>
                 <a:cs typeface="Poppins" panose="00000500000000000000" pitchFamily="2" charset="0"/>
               </a:rPr>
-              <a:t>11 August 2022</a:t>
+              <a:t>12 August 2022</a:t>
             </a:fld>
             <a:endParaRPr lang="en-US" sz="1100" dirty="0">
               <a:solidFill>
@@ -3490,13 +3426,13 @@
           <a:spcPct val="0"/>
         </a:spcBef>
         <a:buNone/>
-        <a:defRPr sz="4400" kern="1200">
+        <a:defRPr sz="2400" kern="1200">
           <a:solidFill>
-            <a:schemeClr val="tx1"/>
+            <a:schemeClr val="bg1"/>
           </a:solidFill>
-          <a:latin typeface="Poppins ExtraBold" panose="00000900000000000000" pitchFamily="2" charset="0"/>
+          <a:latin typeface="Poppins Black" panose="00000A00000000000000" pitchFamily="2" charset="0"/>
           <a:ea typeface="+mj-ea"/>
-          <a:cs typeface="Poppins ExtraBold" panose="00000900000000000000" pitchFamily="2" charset="0"/>
+          <a:cs typeface="Poppins Black" panose="00000A00000000000000" pitchFamily="2" charset="0"/>
         </a:defRPr>
       </a:lvl1pPr>
     </p:titleStyle>
@@ -3510,9 +3446,9 @@
         </a:spcBef>
         <a:buFont typeface="Arial" panose="020B0604020202020204" pitchFamily="34" charset="0"/>
         <a:buChar char="•"/>
-        <a:defRPr sz="2800" kern="1200">
+        <a:defRPr sz="1800" kern="1200">
           <a:solidFill>
-            <a:schemeClr val="tx1"/>
+            <a:srgbClr val="005753"/>
           </a:solidFill>
           <a:latin typeface="Poppins" panose="00000500000000000000" pitchFamily="2" charset="0"/>
           <a:ea typeface="+mn-ea"/>
@@ -3528,9 +3464,9 @@
         </a:spcBef>
         <a:buFont typeface="Arial" panose="020B0604020202020204" pitchFamily="34" charset="0"/>
         <a:buChar char="•"/>
-        <a:defRPr sz="2400" kern="1200">
+        <a:defRPr sz="1600" kern="1200">
           <a:solidFill>
-            <a:schemeClr val="tx1"/>
+            <a:srgbClr val="005753"/>
           </a:solidFill>
           <a:latin typeface="Poppins" panose="00000500000000000000" pitchFamily="2" charset="0"/>
           <a:ea typeface="+mn-ea"/>
@@ -3546,9 +3482,9 @@
         </a:spcBef>
         <a:buFont typeface="Arial" panose="020B0604020202020204" pitchFamily="34" charset="0"/>
         <a:buChar char="•"/>
-        <a:defRPr sz="1600" kern="1200">
+        <a:defRPr sz="1400" kern="1200">
           <a:solidFill>
-            <a:schemeClr val="tx1"/>
+            <a:srgbClr val="005753"/>
           </a:solidFill>
           <a:latin typeface="Poppins" panose="00000500000000000000" pitchFamily="2" charset="0"/>
           <a:ea typeface="+mn-ea"/>
@@ -3564,9 +3500,9 @@
         </a:spcBef>
         <a:buFont typeface="Arial" panose="020B0604020202020204" pitchFamily="34" charset="0"/>
         <a:buChar char="•"/>
-        <a:defRPr sz="1400" kern="1200">
+        <a:defRPr sz="1200" kern="1200">
           <a:solidFill>
-            <a:srgbClr val="77787B"/>
+            <a:srgbClr val="005753"/>
           </a:solidFill>
           <a:latin typeface="Poppins" panose="00000500000000000000" pitchFamily="2" charset="0"/>
           <a:ea typeface="+mn-ea"/>
@@ -3582,9 +3518,9 @@
         </a:spcBef>
         <a:buFont typeface="Arial" panose="020B0604020202020204" pitchFamily="34" charset="0"/>
         <a:buChar char="•"/>
-        <a:defRPr sz="1800" kern="1200">
+        <a:defRPr sz="1000" kern="1200">
           <a:solidFill>
-            <a:schemeClr val="tx1"/>
+            <a:srgbClr val="005753"/>
           </a:solidFill>
           <a:latin typeface="Poppins" panose="00000500000000000000" pitchFamily="2" charset="0"/>
           <a:ea typeface="+mn-ea"/>

</xml_diff>